<commit_message>
Foram adicionadas algumas imagens ao powerpoint
</commit_message>
<xml_diff>
--- a/Trabalho_Pratico/Powerpoint.pptx
+++ b/Trabalho_Pratico/Powerpoint.pptx
@@ -5,7 +5,7 @@
     <p:sldMasterId id="2147483648" r:id="rId1"/>
   </p:sldMasterIdLst>
   <p:notesMasterIdLst>
-    <p:notesMasterId r:id="rId10"/>
+    <p:notesMasterId r:id="rId9"/>
   </p:notesMasterIdLst>
   <p:sldIdLst>
     <p:sldId id="257" r:id="rId2"/>
@@ -13,9 +13,8 @@
     <p:sldId id="263" r:id="rId4"/>
     <p:sldId id="258" r:id="rId5"/>
     <p:sldId id="259" r:id="rId6"/>
-    <p:sldId id="256" r:id="rId7"/>
-    <p:sldId id="260" r:id="rId8"/>
-    <p:sldId id="261" r:id="rId9"/>
+    <p:sldId id="264" r:id="rId7"/>
+    <p:sldId id="256" r:id="rId8"/>
   </p:sldIdLst>
   <p:sldSz cx="12192000" cy="6858000"/>
   <p:notesSz cx="6858000" cy="9144000"/>
@@ -4505,31 +4504,16 @@
         </p:spPr>
         <p:txBody>
           <a:bodyPr vert="horz" lIns="91440" tIns="45720" rIns="91440" bIns="45720" rtlCol="0" anchor="ctr">
-            <a:normAutofit/>
+            <a:normAutofit lnSpcReduction="10000"/>
           </a:bodyPr>
           <a:lstStyle/>
           <a:p>
-            <a:pPr>
-              <a:lnSpc>
-                <a:spcPct val="90000"/>
-              </a:lnSpc>
-              <a:spcAft>
-                <a:spcPts val="600"/>
-              </a:spcAft>
-            </a:pPr>
-            <a:r>
-              <a:rPr lang="en-US" sz="900" kern="1200">
-                <a:solidFill>
-                  <a:schemeClr val="tx1">
-                    <a:lumMod val="50000"/>
-                    <a:lumOff val="50000"/>
-                  </a:schemeClr>
-                </a:solidFill>
-                <a:latin typeface="+mn-lt"/>
-                <a:ea typeface="+mn-ea"/>
-                <a:cs typeface="+mn-cs"/>
+            <a:r>
+              <a:rPr lang="pt-PT" sz="900" dirty="0">
+                <a:ea typeface="Tahoma" panose="020B0604030504040204" pitchFamily="34" charset="0"/>
+                <a:cs typeface="Tahoma" panose="020B0604030504040204" pitchFamily="34" charset="0"/>
               </a:rPr>
-              <a:t> Nuno Gomes 18364, Ricardo Ramos 46638, Rafael Carvalho 47663, Computação Distribuída - SI 23/24 </a:t>
+              <a:t> Rafael Carvalho 47663, Ricardo Ramos 46638, Nuno Gomes 18364 Mineração de dados em larga escala - SV 23/24</a:t>
             </a:r>
           </a:p>
         </p:txBody>
@@ -4728,7 +4712,7 @@
               <a:rPr lang="pt-PT" smtClean="0"/>
               <a:t>2</a:t>
             </a:fld>
-            <a:endParaRPr lang="pt-PT"/>
+            <a:endParaRPr lang="pt-PT" dirty="0"/>
           </a:p>
         </p:txBody>
       </p:sp>
@@ -4806,28 +4790,12 @@
           <a:lstStyle/>
           <a:p>
             <a:r>
-              <a:rPr lang="pt-PT">
-                <a:latin typeface="Tahoma" panose="020B0604030504040204" pitchFamily="34" charset="0"/>
+              <a:rPr lang="pt-PT" dirty="0">
                 <a:ea typeface="Tahoma" panose="020B0604030504040204" pitchFamily="34" charset="0"/>
                 <a:cs typeface="Tahoma" panose="020B0604030504040204" pitchFamily="34" charset="0"/>
               </a:rPr>
-              <a:t> Rafael Carvalho 47663, Ricardo Ramos 46638, </a:t>
-            </a:r>
-          </a:p>
-          <a:p>
-            <a:r>
-              <a:rPr lang="pt-PT">
-                <a:latin typeface="Tahoma" panose="020B0604030504040204" pitchFamily="34" charset="0"/>
-                <a:ea typeface="Tahoma" panose="020B0604030504040204" pitchFamily="34" charset="0"/>
-                <a:cs typeface="Tahoma" panose="020B0604030504040204" pitchFamily="34" charset="0"/>
-              </a:rPr>
-              <a:t>Data Mining - SI 23/24 </a:t>
-            </a:r>
-            <a:endParaRPr lang="pt-PT" dirty="0">
-              <a:latin typeface="Tahoma" panose="020B0604030504040204" pitchFamily="34" charset="0"/>
-              <a:ea typeface="Tahoma" panose="020B0604030504040204" pitchFamily="34" charset="0"/>
-              <a:cs typeface="Tahoma" panose="020B0604030504040204" pitchFamily="34" charset="0"/>
-            </a:endParaRPr>
+              <a:t> Rafael Carvalho 47663, Ricardo Ramos 46638, Nuno Gomes 18364 Mineração de dados em larga escala - SV 23/24</a:t>
+            </a:r>
           </a:p>
         </p:txBody>
       </p:sp>
@@ -5087,15 +5055,74 @@
           <a:p>
             <a:r>
               <a:rPr lang="pt-PT" dirty="0">
-                <a:latin typeface="Tahoma" panose="020B0604030504040204" pitchFamily="34" charset="0"/>
                 <a:ea typeface="Tahoma" panose="020B0604030504040204" pitchFamily="34" charset="0"/>
                 <a:cs typeface="Tahoma" panose="020B0604030504040204" pitchFamily="34" charset="0"/>
               </a:rPr>
-              <a:t> Rafael Carvalho 47663, Ricardo Ramos 46638, Tomás Antunes 45911 Computação Distribuída - SI 23/24 </a:t>
-            </a:r>
-          </a:p>
-        </p:txBody>
-      </p:sp>
+              <a:t> Rafael Carvalho 47663, Ricardo Ramos 46638, Nuno Gomes 18364 Mineração de dados em larga escala - SV 23/24</a:t>
+            </a:r>
+          </a:p>
+        </p:txBody>
+      </p:sp>
+      <p:pic>
+        <p:nvPicPr>
+          <p:cNvPr id="7" name="Imagem 6">
+            <a:extLst>
+              <a:ext uri="{FF2B5EF4-FFF2-40B4-BE49-F238E27FC236}">
+                <a16:creationId xmlns:a16="http://schemas.microsoft.com/office/drawing/2014/main" id="{B68BDB0C-A277-792C-B177-E1C9E13B2C60}"/>
+              </a:ext>
+            </a:extLst>
+          </p:cNvPr>
+          <p:cNvPicPr>
+            <a:picLocks noChangeAspect="1"/>
+          </p:cNvPicPr>
+          <p:nvPr/>
+        </p:nvPicPr>
+        <p:blipFill>
+          <a:blip r:embed="rId3"/>
+          <a:stretch>
+            <a:fillRect/>
+          </a:stretch>
+        </p:blipFill>
+        <p:spPr>
+          <a:xfrm>
+            <a:off x="578445" y="1690687"/>
+            <a:ext cx="5517555" cy="3952875"/>
+          </a:xfrm>
+          <a:prstGeom prst="rect">
+            <a:avLst/>
+          </a:prstGeom>
+        </p:spPr>
+      </p:pic>
+      <p:pic>
+        <p:nvPicPr>
+          <p:cNvPr id="9" name="Imagem 8">
+            <a:extLst>
+              <a:ext uri="{FF2B5EF4-FFF2-40B4-BE49-F238E27FC236}">
+                <a16:creationId xmlns:a16="http://schemas.microsoft.com/office/drawing/2014/main" id="{11B1A611-895B-CBAA-DE7B-689F3C0BF202}"/>
+              </a:ext>
+            </a:extLst>
+          </p:cNvPr>
+          <p:cNvPicPr>
+            <a:picLocks noChangeAspect="1"/>
+          </p:cNvPicPr>
+          <p:nvPr/>
+        </p:nvPicPr>
+        <p:blipFill>
+          <a:blip r:embed="rId4"/>
+          <a:stretch>
+            <a:fillRect/>
+          </a:stretch>
+        </p:blipFill>
+        <p:spPr>
+          <a:xfrm>
+            <a:off x="6214798" y="1690687"/>
+            <a:ext cx="5613056" cy="4071940"/>
+          </a:xfrm>
+          <a:prstGeom prst="rect">
+            <a:avLst/>
+          </a:prstGeom>
+        </p:spPr>
+      </p:pic>
     </p:spTree>
     <p:extLst>
       <p:ext uri="{BB962C8B-B14F-4D97-AF65-F5344CB8AC3E}">
@@ -5262,11 +5289,10 @@
           <a:p>
             <a:r>
               <a:rPr lang="pt-PT" dirty="0">
-                <a:latin typeface="Tahoma" panose="020B0604030504040204" pitchFamily="34" charset="0"/>
                 <a:ea typeface="Tahoma" panose="020B0604030504040204" pitchFamily="34" charset="0"/>
                 <a:cs typeface="Tahoma" panose="020B0604030504040204" pitchFamily="34" charset="0"/>
               </a:rPr>
-              <a:t> Rafael Carvalho 47663, Ricardo Ramos 46638, Tomás Antunes 45911 Computação Distribuída - SI 23/24 </a:t>
+              <a:t> Rafael Carvalho 47663, Ricardo Ramos 46638, Nuno Gomes 18364 Mineração de dados em larga escala - SV 23/24</a:t>
             </a:r>
           </a:p>
         </p:txBody>
@@ -5292,7 +5318,47 @@
           <a:bodyPr/>
           <a:lstStyle/>
           <a:p>
-            <a:endParaRPr lang="pt-PT"/>
+            <a:r>
+              <a:rPr lang="pt-PT" dirty="0"/>
+              <a:t>Imputação de dados</a:t>
+            </a:r>
+          </a:p>
+          <a:p>
+            <a:r>
+              <a:rPr lang="pt-PT" dirty="0" err="1"/>
+              <a:t>Feature</a:t>
+            </a:r>
+            <a:r>
+              <a:rPr lang="pt-PT" dirty="0"/>
+              <a:t> </a:t>
+            </a:r>
+            <a:r>
+              <a:rPr lang="pt-PT" dirty="0" err="1"/>
+              <a:t>Selection</a:t>
+            </a:r>
+            <a:r>
+              <a:rPr lang="pt-PT" dirty="0"/>
+              <a:t> / </a:t>
+            </a:r>
+            <a:r>
+              <a:rPr lang="pt-PT" dirty="0" err="1"/>
+              <a:t>Feature</a:t>
+            </a:r>
+            <a:r>
+              <a:rPr lang="pt-PT" dirty="0"/>
+              <a:t> </a:t>
+            </a:r>
+            <a:r>
+              <a:rPr lang="pt-PT" dirty="0" err="1"/>
+              <a:t>Reduction</a:t>
+            </a:r>
+            <a:endParaRPr lang="pt-PT" dirty="0"/>
+          </a:p>
+          <a:p>
+            <a:r>
+              <a:rPr lang="pt-PT" dirty="0"/>
+              <a:t>Discretização dos dados</a:t>
+            </a:r>
           </a:p>
         </p:txBody>
       </p:sp>
@@ -5419,51 +5485,12 @@
           <a:lstStyle/>
           <a:p>
             <a:r>
-              <a:rPr lang="pt-PT">
-                <a:latin typeface="Tahoma" panose="020B0604030504040204" pitchFamily="34" charset="0"/>
+              <a:rPr lang="pt-PT" dirty="0">
                 <a:ea typeface="Tahoma" panose="020B0604030504040204" pitchFamily="34" charset="0"/>
                 <a:cs typeface="Tahoma" panose="020B0604030504040204" pitchFamily="34" charset="0"/>
               </a:rPr>
-              <a:t> Rafael Carvalho 47663, Ricardo Ramos 46638, Tomás Antunes 45911 Computação Distribuída - SI 23/24 </a:t>
-            </a:r>
-            <a:endParaRPr lang="pt-PT" dirty="0">
-              <a:latin typeface="Tahoma" panose="020B0604030504040204" pitchFamily="34" charset="0"/>
-              <a:ea typeface="Tahoma" panose="020B0604030504040204" pitchFamily="34" charset="0"/>
-              <a:cs typeface="Tahoma" panose="020B0604030504040204" pitchFamily="34" charset="0"/>
-            </a:endParaRPr>
-          </a:p>
-        </p:txBody>
-      </p:sp>
-      <p:sp>
-        <p:nvSpPr>
-          <p:cNvPr id="6" name="Marcador de Posição de Conteúdo 5">
-            <a:extLst>
-              <a:ext uri="{FF2B5EF4-FFF2-40B4-BE49-F238E27FC236}">
-                <a16:creationId xmlns:a16="http://schemas.microsoft.com/office/drawing/2014/main" id="{E334DBFB-ED66-E3EA-EC29-89444F77198B}"/>
-              </a:ext>
-            </a:extLst>
-          </p:cNvPr>
-          <p:cNvSpPr>
-            <a:spLocks noGrp="1"/>
-          </p:cNvSpPr>
-          <p:nvPr>
-            <p:ph idx="1"/>
-          </p:nvPr>
-        </p:nvSpPr>
-        <p:spPr>
-          <a:xfrm>
-            <a:off x="838200" y="1815240"/>
-            <a:ext cx="10515600" cy="4351338"/>
-          </a:xfrm>
-        </p:spPr>
-        <p:txBody>
-          <a:bodyPr/>
-          <a:lstStyle/>
-          <a:p>
-            <a:pPr marL="0" indent="0">
-              <a:buNone/>
-            </a:pPr>
-            <a:endParaRPr lang="pt-PT" dirty="0"/>
+              <a:t> Rafael Carvalho 47663, Ricardo Ramos 46638, Nuno Gomes 18364 Mineração de dados em larga escala - SV 23/24</a:t>
+            </a:r>
           </a:p>
         </p:txBody>
       </p:sp>
@@ -5514,6 +5541,71 @@
           </a:extLst>
         </p:spPr>
       </p:pic>
+      <p:pic>
+        <p:nvPicPr>
+          <p:cNvPr id="7" name="Imagem 6">
+            <a:extLst>
+              <a:ext uri="{FF2B5EF4-FFF2-40B4-BE49-F238E27FC236}">
+                <a16:creationId xmlns:a16="http://schemas.microsoft.com/office/drawing/2014/main" id="{6740BF53-CFCD-82F7-0166-BD632EA99BDD}"/>
+              </a:ext>
+            </a:extLst>
+          </p:cNvPr>
+          <p:cNvPicPr>
+            <a:picLocks noChangeAspect="1"/>
+          </p:cNvPicPr>
+          <p:nvPr/>
+        </p:nvPicPr>
+        <p:blipFill>
+          <a:blip r:embed="rId3"/>
+          <a:stretch>
+            <a:fillRect/>
+          </a:stretch>
+        </p:blipFill>
+        <p:spPr>
+          <a:xfrm>
+            <a:off x="1444478" y="2364451"/>
+            <a:ext cx="9303043" cy="2981326"/>
+          </a:xfrm>
+          <a:prstGeom prst="rect">
+            <a:avLst/>
+          </a:prstGeom>
+        </p:spPr>
+      </p:pic>
+      <p:sp>
+        <p:nvSpPr>
+          <p:cNvPr id="8" name="CaixaDeTexto 7">
+            <a:extLst>
+              <a:ext uri="{FF2B5EF4-FFF2-40B4-BE49-F238E27FC236}">
+                <a16:creationId xmlns:a16="http://schemas.microsoft.com/office/drawing/2014/main" id="{911FB1A3-1A54-1585-F3CF-CEC5E7B0F832}"/>
+              </a:ext>
+            </a:extLst>
+          </p:cNvPr>
+          <p:cNvSpPr txBox="1"/>
+          <p:nvPr/>
+        </p:nvSpPr>
+        <p:spPr>
+          <a:xfrm>
+            <a:off x="4845817" y="1978699"/>
+            <a:ext cx="2500364" cy="369332"/>
+          </a:xfrm>
+          <a:prstGeom prst="rect">
+            <a:avLst/>
+          </a:prstGeom>
+          <a:noFill/>
+        </p:spPr>
+        <p:txBody>
+          <a:bodyPr wrap="none" rtlCol="0">
+            <a:spAutoFit/>
+          </a:bodyPr>
+          <a:lstStyle/>
+          <a:p>
+            <a:r>
+              <a:rPr lang="pt-PT" dirty="0"/>
+              <a:t>Modelos de classificação</a:t>
+            </a:r>
+          </a:p>
+        </p:txBody>
+      </p:sp>
     </p:spTree>
     <p:extLst>
       <p:ext uri="{BB962C8B-B14F-4D97-AF65-F5344CB8AC3E}">
@@ -5546,6 +5638,250 @@
       </p:grpSpPr>
       <p:sp>
         <p:nvSpPr>
+          <p:cNvPr id="2" name="Título 1">
+            <a:extLst>
+              <a:ext uri="{FF2B5EF4-FFF2-40B4-BE49-F238E27FC236}">
+                <a16:creationId xmlns:a16="http://schemas.microsoft.com/office/drawing/2014/main" id="{29D1BBAE-9220-2652-9DDB-A8E3E8326D05}"/>
+              </a:ext>
+            </a:extLst>
+          </p:cNvPr>
+          <p:cNvSpPr>
+            <a:spLocks noGrp="1"/>
+          </p:cNvSpPr>
+          <p:nvPr>
+            <p:ph type="title"/>
+          </p:nvPr>
+        </p:nvSpPr>
+        <p:spPr/>
+        <p:txBody>
+          <a:bodyPr/>
+          <a:lstStyle/>
+          <a:p>
+            <a:r>
+              <a:rPr lang="pt-PT">
+                <a:latin typeface="Tahoma" panose="020B0604030504040204" pitchFamily="34" charset="0"/>
+                <a:ea typeface="Tahoma" panose="020B0604030504040204" pitchFamily="34" charset="0"/>
+                <a:cs typeface="Tahoma" panose="020B0604030504040204" pitchFamily="34" charset="0"/>
+              </a:rPr>
+              <a:t>Apresentação dos modelos e comparação de resultados</a:t>
+            </a:r>
+            <a:endParaRPr lang="pt-PT" dirty="0">
+              <a:latin typeface="Tahoma" panose="020B0604030504040204" pitchFamily="34" charset="0"/>
+              <a:ea typeface="Tahoma" panose="020B0604030504040204" pitchFamily="34" charset="0"/>
+              <a:cs typeface="Tahoma" panose="020B0604030504040204" pitchFamily="34" charset="0"/>
+            </a:endParaRPr>
+          </a:p>
+        </p:txBody>
+      </p:sp>
+      <p:sp>
+        <p:nvSpPr>
+          <p:cNvPr id="4" name="Marcador de Posição do Número do Diapositivo 3">
+            <a:extLst>
+              <a:ext uri="{FF2B5EF4-FFF2-40B4-BE49-F238E27FC236}">
+                <a16:creationId xmlns:a16="http://schemas.microsoft.com/office/drawing/2014/main" id="{7311352B-7EC9-630B-958F-449DF547465D}"/>
+              </a:ext>
+            </a:extLst>
+          </p:cNvPr>
+          <p:cNvSpPr>
+            <a:spLocks noGrp="1"/>
+          </p:cNvSpPr>
+          <p:nvPr>
+            <p:ph type="sldNum" sz="quarter" idx="12"/>
+          </p:nvPr>
+        </p:nvSpPr>
+        <p:spPr/>
+        <p:txBody>
+          <a:bodyPr/>
+          <a:lstStyle/>
+          <a:p>
+            <a:fld id="{5E62556B-3FFF-4B1B-8C77-ABD6DF445F62}" type="slidenum">
+              <a:rPr lang="pt-PT" smtClean="0"/>
+              <a:t>6</a:t>
+            </a:fld>
+            <a:endParaRPr lang="pt-PT"/>
+          </a:p>
+        </p:txBody>
+      </p:sp>
+      <p:sp>
+        <p:nvSpPr>
+          <p:cNvPr id="3" name="Marcador de Posição do Rodapé 8">
+            <a:extLst>
+              <a:ext uri="{FF2B5EF4-FFF2-40B4-BE49-F238E27FC236}">
+                <a16:creationId xmlns:a16="http://schemas.microsoft.com/office/drawing/2014/main" id="{20AA4C8B-0441-E5AD-A3A4-346E72E9D7EC}"/>
+              </a:ext>
+            </a:extLst>
+          </p:cNvPr>
+          <p:cNvSpPr>
+            <a:spLocks noGrp="1"/>
+          </p:cNvSpPr>
+          <p:nvPr>
+            <p:ph type="ftr" sz="quarter" idx="11"/>
+          </p:nvPr>
+        </p:nvSpPr>
+        <p:spPr>
+          <a:xfrm>
+            <a:off x="3635579" y="6291131"/>
+            <a:ext cx="4920842" cy="430344"/>
+          </a:xfrm>
+        </p:spPr>
+        <p:txBody>
+          <a:bodyPr/>
+          <a:lstStyle/>
+          <a:p>
+            <a:r>
+              <a:rPr lang="pt-PT" dirty="0">
+                <a:ea typeface="Tahoma" panose="020B0604030504040204" pitchFamily="34" charset="0"/>
+                <a:cs typeface="Tahoma" panose="020B0604030504040204" pitchFamily="34" charset="0"/>
+              </a:rPr>
+              <a:t> Rafael Carvalho 47663, Ricardo Ramos 46638, Nuno Gomes 18364 Mineração de dados em larga escala - SV 23/24</a:t>
+            </a:r>
+          </a:p>
+        </p:txBody>
+      </p:sp>
+      <p:pic>
+        <p:nvPicPr>
+          <p:cNvPr id="13" name="Picture 2" descr="logo-isel | InOut">
+            <a:extLst>
+              <a:ext uri="{FF2B5EF4-FFF2-40B4-BE49-F238E27FC236}">
+                <a16:creationId xmlns:a16="http://schemas.microsoft.com/office/drawing/2014/main" id="{78DB3CA3-46DA-6670-DD24-AD55AEB83DAD}"/>
+              </a:ext>
+            </a:extLst>
+          </p:cNvPr>
+          <p:cNvPicPr>
+            <a:picLocks noChangeAspect="1" noChangeArrowheads="1"/>
+          </p:cNvPicPr>
+          <p:nvPr/>
+        </p:nvPicPr>
+        <p:blipFill>
+          <a:blip r:embed="rId2">
+            <a:extLst>
+              <a:ext uri="{28A0092B-C50C-407E-A947-70E740481C1C}">
+                <a14:useLocalDpi xmlns:a14="http://schemas.microsoft.com/office/drawing/2010/main" val="0"/>
+              </a:ext>
+            </a:extLst>
+          </a:blip>
+          <a:srcRect/>
+          <a:stretch>
+            <a:fillRect/>
+          </a:stretch>
+        </p:blipFill>
+        <p:spPr bwMode="auto">
+          <a:xfrm>
+            <a:off x="9982200" y="5533527"/>
+            <a:ext cx="1661620" cy="1000198"/>
+          </a:xfrm>
+          <a:prstGeom prst="rect">
+            <a:avLst/>
+          </a:prstGeom>
+          <a:noFill/>
+          <a:extLst>
+            <a:ext uri="{909E8E84-426E-40DD-AFC4-6F175D3DCCD1}">
+              <a14:hiddenFill xmlns:a14="http://schemas.microsoft.com/office/drawing/2010/main">
+                <a:solidFill>
+                  <a:srgbClr val="FFFFFF"/>
+                </a:solidFill>
+              </a14:hiddenFill>
+            </a:ext>
+          </a:extLst>
+        </p:spPr>
+      </p:pic>
+      <p:sp>
+        <p:nvSpPr>
+          <p:cNvPr id="8" name="CaixaDeTexto 7">
+            <a:extLst>
+              <a:ext uri="{FF2B5EF4-FFF2-40B4-BE49-F238E27FC236}">
+                <a16:creationId xmlns:a16="http://schemas.microsoft.com/office/drawing/2014/main" id="{911FB1A3-1A54-1585-F3CF-CEC5E7B0F832}"/>
+              </a:ext>
+            </a:extLst>
+          </p:cNvPr>
+          <p:cNvSpPr txBox="1"/>
+          <p:nvPr/>
+        </p:nvSpPr>
+        <p:spPr>
+          <a:xfrm>
+            <a:off x="4872252" y="1977046"/>
+            <a:ext cx="2254528" cy="369332"/>
+          </a:xfrm>
+          <a:prstGeom prst="rect">
+            <a:avLst/>
+          </a:prstGeom>
+          <a:noFill/>
+        </p:spPr>
+        <p:txBody>
+          <a:bodyPr wrap="none" rtlCol="0">
+            <a:spAutoFit/>
+          </a:bodyPr>
+          <a:lstStyle/>
+          <a:p>
+            <a:r>
+              <a:rPr lang="pt-PT" dirty="0"/>
+              <a:t>Modelos de regressão</a:t>
+            </a:r>
+          </a:p>
+        </p:txBody>
+      </p:sp>
+      <p:pic>
+        <p:nvPicPr>
+          <p:cNvPr id="6" name="Imagem 5">
+            <a:extLst>
+              <a:ext uri="{FF2B5EF4-FFF2-40B4-BE49-F238E27FC236}">
+                <a16:creationId xmlns:a16="http://schemas.microsoft.com/office/drawing/2014/main" id="{D0DB6268-C34B-AC71-B586-9540F4BF411C}"/>
+              </a:ext>
+            </a:extLst>
+          </p:cNvPr>
+          <p:cNvPicPr>
+            <a:picLocks noChangeAspect="1"/>
+          </p:cNvPicPr>
+          <p:nvPr/>
+        </p:nvPicPr>
+        <p:blipFill>
+          <a:blip r:embed="rId3"/>
+          <a:stretch>
+            <a:fillRect/>
+          </a:stretch>
+        </p:blipFill>
+        <p:spPr>
+          <a:xfrm>
+            <a:off x="2309435" y="2512229"/>
+            <a:ext cx="7380162" cy="1325563"/>
+          </a:xfrm>
+          <a:prstGeom prst="rect">
+            <a:avLst/>
+          </a:prstGeom>
+        </p:spPr>
+      </p:pic>
+    </p:spTree>
+    <p:extLst>
+      <p:ext uri="{BB962C8B-B14F-4D97-AF65-F5344CB8AC3E}">
+        <p14:creationId xmlns:p14="http://schemas.microsoft.com/office/powerpoint/2010/main" val="1113297657"/>
+      </p:ext>
+    </p:extLst>
+  </p:cSld>
+  <p:clrMapOvr>
+    <a:masterClrMapping/>
+  </p:clrMapOvr>
+</p:sld>
+</file>
+
+<file path=ppt/slides/slide7.xml><?xml version="1.0" encoding="utf-8"?>
+<p:sld xmlns:a="http://schemas.openxmlformats.org/drawingml/2006/main" xmlns:r="http://schemas.openxmlformats.org/officeDocument/2006/relationships" xmlns:p="http://schemas.openxmlformats.org/presentationml/2006/main">
+  <p:cSld>
+    <p:spTree>
+      <p:nvGrpSpPr>
+        <p:cNvPr id="1" name=""/>
+        <p:cNvGrpSpPr/>
+        <p:nvPr/>
+      </p:nvGrpSpPr>
+      <p:grpSpPr>
+        <a:xfrm>
+          <a:off x="0" y="0"/>
+          <a:ext cx="0" cy="0"/>
+          <a:chOff x="0" y="0"/>
+          <a:chExt cx="0" cy="0"/>
+        </a:xfrm>
+      </p:grpSpPr>
+      <p:sp>
+        <p:nvSpPr>
           <p:cNvPr id="8" name="Título 1">
             <a:extLst>
               <a:ext uri="{FF2B5EF4-FFF2-40B4-BE49-F238E27FC236}">
@@ -5631,7 +5967,7 @@
           <a:p>
             <a:fld id="{5E62556B-3FFF-4B1B-8C77-ABD6DF445F62}" type="slidenum">
               <a:rPr lang="pt-PT" smtClean="0"/>
-              <a:t>6</a:t>
+              <a:t>7</a:t>
             </a:fld>
             <a:endParaRPr lang="pt-PT"/>
           </a:p>
@@ -5712,11 +6048,10 @@
           <a:p>
             <a:r>
               <a:rPr lang="pt-PT" dirty="0">
-                <a:latin typeface="Tahoma" panose="020B0604030504040204" pitchFamily="34" charset="0"/>
                 <a:ea typeface="Tahoma" panose="020B0604030504040204" pitchFamily="34" charset="0"/>
                 <a:cs typeface="Tahoma" panose="020B0604030504040204" pitchFamily="34" charset="0"/>
               </a:rPr>
-              <a:t> Rafael Carvalho 47663, Ricardo Ramos 46638, Tomás Antunes 45911 Computação Distribuída - SI 23/24 </a:t>
+              <a:t> Rafael Carvalho 47663, Ricardo Ramos 46638, Nuno Gomes 18364 Mineração de dados em larga escala - SV 23/24</a:t>
             </a:r>
           </a:p>
         </p:txBody>
@@ -5739,896 +6074,6 @@
       <p:transition/>
     </mc:Fallback>
   </mc:AlternateContent>
-</p:sld>
-</file>
-
-<file path=ppt/slides/slide7.xml><?xml version="1.0" encoding="utf-8"?>
-<p:sld xmlns:a="http://schemas.openxmlformats.org/drawingml/2006/main" xmlns:r="http://schemas.openxmlformats.org/officeDocument/2006/relationships" xmlns:p="http://schemas.openxmlformats.org/presentationml/2006/main">
-  <p:cSld>
-    <p:spTree>
-      <p:nvGrpSpPr>
-        <p:cNvPr id="1" name=""/>
-        <p:cNvGrpSpPr/>
-        <p:nvPr/>
-      </p:nvGrpSpPr>
-      <p:grpSpPr>
-        <a:xfrm>
-          <a:off x="0" y="0"/>
-          <a:ext cx="0" cy="0"/>
-          <a:chOff x="0" y="0"/>
-          <a:chExt cx="0" cy="0"/>
-        </a:xfrm>
-      </p:grpSpPr>
-      <p:sp>
-        <p:nvSpPr>
-          <p:cNvPr id="2" name="Título 1">
-            <a:extLst>
-              <a:ext uri="{FF2B5EF4-FFF2-40B4-BE49-F238E27FC236}">
-                <a16:creationId xmlns:a16="http://schemas.microsoft.com/office/drawing/2014/main" id="{1ADD54DF-4274-308E-EB78-4163BBBE0B50}"/>
-              </a:ext>
-            </a:extLst>
-          </p:cNvPr>
-          <p:cNvSpPr>
-            <a:spLocks noGrp="1"/>
-          </p:cNvSpPr>
-          <p:nvPr>
-            <p:ph type="title"/>
-          </p:nvPr>
-        </p:nvSpPr>
-        <p:spPr/>
-        <p:txBody>
-          <a:bodyPr/>
-          <a:lstStyle/>
-          <a:p>
-            <a:r>
-              <a:rPr lang="pt-PT" dirty="0" err="1">
-                <a:latin typeface="Tahoma" panose="020B0604030504040204" pitchFamily="34" charset="0"/>
-                <a:ea typeface="Tahoma" panose="020B0604030504040204" pitchFamily="34" charset="0"/>
-                <a:cs typeface="Tahoma" panose="020B0604030504040204" pitchFamily="34" charset="0"/>
-              </a:rPr>
-              <a:t>ManagerApp</a:t>
-            </a:r>
-            <a:endParaRPr lang="pt-PT" dirty="0">
-              <a:latin typeface="Tahoma" panose="020B0604030504040204" pitchFamily="34" charset="0"/>
-              <a:ea typeface="Tahoma" panose="020B0604030504040204" pitchFamily="34" charset="0"/>
-              <a:cs typeface="Tahoma" panose="020B0604030504040204" pitchFamily="34" charset="0"/>
-            </a:endParaRPr>
-          </a:p>
-        </p:txBody>
-      </p:sp>
-      <p:sp>
-        <p:nvSpPr>
-          <p:cNvPr id="4" name="Marcador de Posição do Número do Diapositivo 3">
-            <a:extLst>
-              <a:ext uri="{FF2B5EF4-FFF2-40B4-BE49-F238E27FC236}">
-                <a16:creationId xmlns:a16="http://schemas.microsoft.com/office/drawing/2014/main" id="{07C48A72-2A1F-B382-D462-2079E76E301D}"/>
-              </a:ext>
-            </a:extLst>
-          </p:cNvPr>
-          <p:cNvSpPr>
-            <a:spLocks noGrp="1"/>
-          </p:cNvSpPr>
-          <p:nvPr>
-            <p:ph type="sldNum" sz="quarter" idx="12"/>
-          </p:nvPr>
-        </p:nvSpPr>
-        <p:spPr/>
-        <p:txBody>
-          <a:bodyPr/>
-          <a:lstStyle/>
-          <a:p>
-            <a:fld id="{5E62556B-3FFF-4B1B-8C77-ABD6DF445F62}" type="slidenum">
-              <a:rPr lang="pt-PT" smtClean="0"/>
-              <a:t>7</a:t>
-            </a:fld>
-            <a:endParaRPr lang="pt-PT"/>
-          </a:p>
-        </p:txBody>
-      </p:sp>
-      <p:sp>
-        <p:nvSpPr>
-          <p:cNvPr id="6" name="Marcador de Posição do Rodapé 8">
-            <a:extLst>
-              <a:ext uri="{FF2B5EF4-FFF2-40B4-BE49-F238E27FC236}">
-                <a16:creationId xmlns:a16="http://schemas.microsoft.com/office/drawing/2014/main" id="{9E9EF00E-7C50-B517-F632-1DA8B364DC49}"/>
-              </a:ext>
-            </a:extLst>
-          </p:cNvPr>
-          <p:cNvSpPr>
-            <a:spLocks noGrp="1"/>
-          </p:cNvSpPr>
-          <p:nvPr>
-            <p:ph type="ftr" sz="quarter" idx="11"/>
-          </p:nvPr>
-        </p:nvSpPr>
-        <p:spPr>
-          <a:xfrm>
-            <a:off x="3635579" y="6291131"/>
-            <a:ext cx="4920842" cy="430344"/>
-          </a:xfrm>
-        </p:spPr>
-        <p:txBody>
-          <a:bodyPr/>
-          <a:lstStyle/>
-          <a:p>
-            <a:r>
-              <a:rPr lang="pt-PT" dirty="0">
-                <a:latin typeface="Tahoma" panose="020B0604030504040204" pitchFamily="34" charset="0"/>
-                <a:ea typeface="Tahoma" panose="020B0604030504040204" pitchFamily="34" charset="0"/>
-                <a:cs typeface="Tahoma" panose="020B0604030504040204" pitchFamily="34" charset="0"/>
-              </a:rPr>
-              <a:t> Rafael Carvalho 47663, Ricardo Ramos 46638, Tomás Antunes 45911 Computação Distribuída - SI 23/24 </a:t>
-            </a:r>
-          </a:p>
-        </p:txBody>
-      </p:sp>
-      <p:pic>
-        <p:nvPicPr>
-          <p:cNvPr id="7" name="Picture 2" descr="logo-isel | InOut">
-            <a:extLst>
-              <a:ext uri="{FF2B5EF4-FFF2-40B4-BE49-F238E27FC236}">
-                <a16:creationId xmlns:a16="http://schemas.microsoft.com/office/drawing/2014/main" id="{60CCD20C-3A75-8024-EA61-8F240258D5C6}"/>
-              </a:ext>
-            </a:extLst>
-          </p:cNvPr>
-          <p:cNvPicPr>
-            <a:picLocks noChangeAspect="1" noChangeArrowheads="1"/>
-          </p:cNvPicPr>
-          <p:nvPr/>
-        </p:nvPicPr>
-        <p:blipFill>
-          <a:blip r:embed="rId2">
-            <a:extLst>
-              <a:ext uri="{28A0092B-C50C-407E-A947-70E740481C1C}">
-                <a14:useLocalDpi xmlns:a14="http://schemas.microsoft.com/office/drawing/2010/main" val="0"/>
-              </a:ext>
-            </a:extLst>
-          </a:blip>
-          <a:srcRect/>
-          <a:stretch>
-            <a:fillRect/>
-          </a:stretch>
-        </p:blipFill>
-        <p:spPr bwMode="auto">
-          <a:xfrm>
-            <a:off x="9916886" y="527807"/>
-            <a:ext cx="1661620" cy="1000198"/>
-          </a:xfrm>
-          <a:prstGeom prst="rect">
-            <a:avLst/>
-          </a:prstGeom>
-          <a:noFill/>
-          <a:extLst>
-            <a:ext uri="{909E8E84-426E-40DD-AFC4-6F175D3DCCD1}">
-              <a14:hiddenFill xmlns:a14="http://schemas.microsoft.com/office/drawing/2010/main">
-                <a:solidFill>
-                  <a:srgbClr val="FFFFFF"/>
-                </a:solidFill>
-              </a14:hiddenFill>
-            </a:ext>
-          </a:extLst>
-        </p:spPr>
-      </p:pic>
-      <p:pic>
-        <p:nvPicPr>
-          <p:cNvPr id="9" name="Imagem 8">
-            <a:extLst>
-              <a:ext uri="{FF2B5EF4-FFF2-40B4-BE49-F238E27FC236}">
-                <a16:creationId xmlns:a16="http://schemas.microsoft.com/office/drawing/2014/main" id="{FE613A78-3786-941C-0450-11D1D42EF1F1}"/>
-              </a:ext>
-            </a:extLst>
-          </p:cNvPr>
-          <p:cNvPicPr>
-            <a:picLocks noChangeAspect="1"/>
-          </p:cNvPicPr>
-          <p:nvPr/>
-        </p:nvPicPr>
-        <p:blipFill>
-          <a:blip r:embed="rId3"/>
-          <a:stretch>
-            <a:fillRect/>
-          </a:stretch>
-        </p:blipFill>
-        <p:spPr>
-          <a:xfrm>
-            <a:off x="625305" y="2938677"/>
-            <a:ext cx="4920842" cy="2169683"/>
-          </a:xfrm>
-          <a:prstGeom prst="rect">
-            <a:avLst/>
-          </a:prstGeom>
-        </p:spPr>
-      </p:pic>
-      <p:pic>
-        <p:nvPicPr>
-          <p:cNvPr id="3074" name="Picture 2">
-            <a:extLst>
-              <a:ext uri="{FF2B5EF4-FFF2-40B4-BE49-F238E27FC236}">
-                <a16:creationId xmlns:a16="http://schemas.microsoft.com/office/drawing/2014/main" id="{F1F0F768-15C5-4D42-4BBF-135B027DADC2}"/>
-              </a:ext>
-            </a:extLst>
-          </p:cNvPr>
-          <p:cNvPicPr>
-            <a:picLocks noChangeAspect="1" noChangeArrowheads="1"/>
-          </p:cNvPicPr>
-          <p:nvPr/>
-        </p:nvPicPr>
-        <p:blipFill rotWithShape="1">
-          <a:blip r:embed="rId4">
-            <a:extLst>
-              <a:ext uri="{28A0092B-C50C-407E-A947-70E740481C1C}">
-                <a14:useLocalDpi xmlns:a14="http://schemas.microsoft.com/office/drawing/2010/main" val="0"/>
-              </a:ext>
-            </a:extLst>
-          </a:blip>
-          <a:srcRect t="13619" r="36799"/>
-          <a:stretch/>
-        </p:blipFill>
-        <p:spPr bwMode="auto">
-          <a:xfrm>
-            <a:off x="6096000" y="2938677"/>
-            <a:ext cx="5414462" cy="2169683"/>
-          </a:xfrm>
-          <a:prstGeom prst="rect">
-            <a:avLst/>
-          </a:prstGeom>
-          <a:noFill/>
-          <a:extLst>
-            <a:ext uri="{909E8E84-426E-40DD-AFC4-6F175D3DCCD1}">
-              <a14:hiddenFill xmlns:a14="http://schemas.microsoft.com/office/drawing/2010/main">
-                <a:solidFill>
-                  <a:srgbClr val="FFFFFF"/>
-                </a:solidFill>
-              </a14:hiddenFill>
-            </a:ext>
-          </a:extLst>
-        </p:spPr>
-      </p:pic>
-      <p:sp>
-        <p:nvSpPr>
-          <p:cNvPr id="10" name="Marcador de Posição de Conteúdo 2">
-            <a:extLst>
-              <a:ext uri="{FF2B5EF4-FFF2-40B4-BE49-F238E27FC236}">
-                <a16:creationId xmlns:a16="http://schemas.microsoft.com/office/drawing/2014/main" id="{880BD5E0-F51F-E85A-A521-62AC6D675B00}"/>
-              </a:ext>
-            </a:extLst>
-          </p:cNvPr>
-          <p:cNvSpPr txBox="1">
-            <a:spLocks/>
-          </p:cNvSpPr>
-          <p:nvPr/>
-        </p:nvSpPr>
-        <p:spPr>
-          <a:xfrm>
-            <a:off x="838200" y="1825625"/>
-            <a:ext cx="10515600" cy="4351338"/>
-          </a:xfrm>
-          <a:prstGeom prst="rect">
-            <a:avLst/>
-          </a:prstGeom>
-        </p:spPr>
-        <p:txBody>
-          <a:bodyPr vert="horz" lIns="91440" tIns="45720" rIns="91440" bIns="45720" rtlCol="0">
-            <a:normAutofit/>
-          </a:bodyPr>
-          <a:lstStyle>
-            <a:lvl1pPr marL="228600" indent="-228600" algn="l" defTabSz="914400" rtl="0" eaLnBrk="1" latinLnBrk="0" hangingPunct="1">
-              <a:lnSpc>
-                <a:spcPct val="90000"/>
-              </a:lnSpc>
-              <a:spcBef>
-                <a:spcPts val="1000"/>
-              </a:spcBef>
-              <a:buFont typeface="Arial" panose="020B0604020202020204" pitchFamily="34" charset="0"/>
-              <a:buChar char="•"/>
-              <a:defRPr sz="2800" kern="1200">
-                <a:solidFill>
-                  <a:schemeClr val="tx1"/>
-                </a:solidFill>
-                <a:latin typeface="+mn-lt"/>
-                <a:ea typeface="+mn-ea"/>
-                <a:cs typeface="+mn-cs"/>
-              </a:defRPr>
-            </a:lvl1pPr>
-            <a:lvl2pPr marL="685800" indent="-228600" algn="l" defTabSz="914400" rtl="0" eaLnBrk="1" latinLnBrk="0" hangingPunct="1">
-              <a:lnSpc>
-                <a:spcPct val="90000"/>
-              </a:lnSpc>
-              <a:spcBef>
-                <a:spcPts val="500"/>
-              </a:spcBef>
-              <a:buFont typeface="Arial" panose="020B0604020202020204" pitchFamily="34" charset="0"/>
-              <a:buChar char="•"/>
-              <a:defRPr sz="2400" kern="1200">
-                <a:solidFill>
-                  <a:schemeClr val="tx1"/>
-                </a:solidFill>
-                <a:latin typeface="+mn-lt"/>
-                <a:ea typeface="+mn-ea"/>
-                <a:cs typeface="+mn-cs"/>
-              </a:defRPr>
-            </a:lvl2pPr>
-            <a:lvl3pPr marL="1143000" indent="-228600" algn="l" defTabSz="914400" rtl="0" eaLnBrk="1" latinLnBrk="0" hangingPunct="1">
-              <a:lnSpc>
-                <a:spcPct val="90000"/>
-              </a:lnSpc>
-              <a:spcBef>
-                <a:spcPts val="500"/>
-              </a:spcBef>
-              <a:buFont typeface="Arial" panose="020B0604020202020204" pitchFamily="34" charset="0"/>
-              <a:buChar char="•"/>
-              <a:defRPr sz="2000" kern="1200">
-                <a:solidFill>
-                  <a:schemeClr val="tx1"/>
-                </a:solidFill>
-                <a:latin typeface="+mn-lt"/>
-                <a:ea typeface="+mn-ea"/>
-                <a:cs typeface="+mn-cs"/>
-              </a:defRPr>
-            </a:lvl3pPr>
-            <a:lvl4pPr marL="1600200" indent="-228600" algn="l" defTabSz="914400" rtl="0" eaLnBrk="1" latinLnBrk="0" hangingPunct="1">
-              <a:lnSpc>
-                <a:spcPct val="90000"/>
-              </a:lnSpc>
-              <a:spcBef>
-                <a:spcPts val="500"/>
-              </a:spcBef>
-              <a:buFont typeface="Arial" panose="020B0604020202020204" pitchFamily="34" charset="0"/>
-              <a:buChar char="•"/>
-              <a:defRPr sz="1800" kern="1200">
-                <a:solidFill>
-                  <a:schemeClr val="tx1"/>
-                </a:solidFill>
-                <a:latin typeface="+mn-lt"/>
-                <a:ea typeface="+mn-ea"/>
-                <a:cs typeface="+mn-cs"/>
-              </a:defRPr>
-            </a:lvl4pPr>
-            <a:lvl5pPr marL="2057400" indent="-228600" algn="l" defTabSz="914400" rtl="0" eaLnBrk="1" latinLnBrk="0" hangingPunct="1">
-              <a:lnSpc>
-                <a:spcPct val="90000"/>
-              </a:lnSpc>
-              <a:spcBef>
-                <a:spcPts val="500"/>
-              </a:spcBef>
-              <a:buFont typeface="Arial" panose="020B0604020202020204" pitchFamily="34" charset="0"/>
-              <a:buChar char="•"/>
-              <a:defRPr sz="1800" kern="1200">
-                <a:solidFill>
-                  <a:schemeClr val="tx1"/>
-                </a:solidFill>
-                <a:latin typeface="+mn-lt"/>
-                <a:ea typeface="+mn-ea"/>
-                <a:cs typeface="+mn-cs"/>
-              </a:defRPr>
-            </a:lvl5pPr>
-            <a:lvl6pPr marL="2514600" indent="-228600" algn="l" defTabSz="914400" rtl="0" eaLnBrk="1" latinLnBrk="0" hangingPunct="1">
-              <a:lnSpc>
-                <a:spcPct val="90000"/>
-              </a:lnSpc>
-              <a:spcBef>
-                <a:spcPts val="500"/>
-              </a:spcBef>
-              <a:buFont typeface="Arial" panose="020B0604020202020204" pitchFamily="34" charset="0"/>
-              <a:buChar char="•"/>
-              <a:defRPr sz="1800" kern="1200">
-                <a:solidFill>
-                  <a:schemeClr val="tx1"/>
-                </a:solidFill>
-                <a:latin typeface="+mn-lt"/>
-                <a:ea typeface="+mn-ea"/>
-                <a:cs typeface="+mn-cs"/>
-              </a:defRPr>
-            </a:lvl6pPr>
-            <a:lvl7pPr marL="2971800" indent="-228600" algn="l" defTabSz="914400" rtl="0" eaLnBrk="1" latinLnBrk="0" hangingPunct="1">
-              <a:lnSpc>
-                <a:spcPct val="90000"/>
-              </a:lnSpc>
-              <a:spcBef>
-                <a:spcPts val="500"/>
-              </a:spcBef>
-              <a:buFont typeface="Arial" panose="020B0604020202020204" pitchFamily="34" charset="0"/>
-              <a:buChar char="•"/>
-              <a:defRPr sz="1800" kern="1200">
-                <a:solidFill>
-                  <a:schemeClr val="tx1"/>
-                </a:solidFill>
-                <a:latin typeface="+mn-lt"/>
-                <a:ea typeface="+mn-ea"/>
-                <a:cs typeface="+mn-cs"/>
-              </a:defRPr>
-            </a:lvl7pPr>
-            <a:lvl8pPr marL="3429000" indent="-228600" algn="l" defTabSz="914400" rtl="0" eaLnBrk="1" latinLnBrk="0" hangingPunct="1">
-              <a:lnSpc>
-                <a:spcPct val="90000"/>
-              </a:lnSpc>
-              <a:spcBef>
-                <a:spcPts val="500"/>
-              </a:spcBef>
-              <a:buFont typeface="Arial" panose="020B0604020202020204" pitchFamily="34" charset="0"/>
-              <a:buChar char="•"/>
-              <a:defRPr sz="1800" kern="1200">
-                <a:solidFill>
-                  <a:schemeClr val="tx1"/>
-                </a:solidFill>
-                <a:latin typeface="+mn-lt"/>
-                <a:ea typeface="+mn-ea"/>
-                <a:cs typeface="+mn-cs"/>
-              </a:defRPr>
-            </a:lvl8pPr>
-            <a:lvl9pPr marL="3886200" indent="-228600" algn="l" defTabSz="914400" rtl="0" eaLnBrk="1" latinLnBrk="0" hangingPunct="1">
-              <a:lnSpc>
-                <a:spcPct val="90000"/>
-              </a:lnSpc>
-              <a:spcBef>
-                <a:spcPts val="500"/>
-              </a:spcBef>
-              <a:buFont typeface="Arial" panose="020B0604020202020204" pitchFamily="34" charset="0"/>
-              <a:buChar char="•"/>
-              <a:defRPr sz="1800" kern="1200">
-                <a:solidFill>
-                  <a:schemeClr val="tx1"/>
-                </a:solidFill>
-                <a:latin typeface="+mn-lt"/>
-                <a:ea typeface="+mn-ea"/>
-                <a:cs typeface="+mn-cs"/>
-              </a:defRPr>
-            </a:lvl9pPr>
-          </a:lstStyle>
-          <a:p>
-            <a:r>
-              <a:rPr lang="pt-PT" dirty="0">
-                <a:latin typeface="Tahoma" panose="020B0604030504040204" pitchFamily="34" charset="0"/>
-                <a:ea typeface="Tahoma" panose="020B0604030504040204" pitchFamily="34" charset="0"/>
-                <a:cs typeface="Tahoma" panose="020B0604030504040204" pitchFamily="34" charset="0"/>
-              </a:rPr>
-              <a:t>Implementa o contrato para pedir resumos aos </a:t>
-            </a:r>
-            <a:r>
-              <a:rPr lang="pt-PT" i="1" dirty="0" err="1">
-                <a:latin typeface="Tahoma" panose="020B0604030504040204" pitchFamily="34" charset="0"/>
-                <a:ea typeface="Tahoma" panose="020B0604030504040204" pitchFamily="34" charset="0"/>
-                <a:cs typeface="Tahoma" panose="020B0604030504040204" pitchFamily="34" charset="0"/>
-              </a:rPr>
-              <a:t>workers</a:t>
-            </a:r>
-            <a:endParaRPr lang="pt-PT" dirty="0">
-              <a:latin typeface="Tahoma" panose="020B0604030504040204" pitchFamily="34" charset="0"/>
-              <a:ea typeface="Tahoma" panose="020B0604030504040204" pitchFamily="34" charset="0"/>
-              <a:cs typeface="Tahoma" panose="020B0604030504040204" pitchFamily="34" charset="0"/>
-            </a:endParaRPr>
-          </a:p>
-        </p:txBody>
-      </p:sp>
-    </p:spTree>
-    <p:extLst>
-      <p:ext uri="{BB962C8B-B14F-4D97-AF65-F5344CB8AC3E}">
-        <p14:creationId xmlns:p14="http://schemas.microsoft.com/office/powerpoint/2010/main" val="3871882863"/>
-      </p:ext>
-    </p:extLst>
-  </p:cSld>
-  <p:clrMapOvr>
-    <a:masterClrMapping/>
-  </p:clrMapOvr>
-</p:sld>
-</file>
-
-<file path=ppt/slides/slide8.xml><?xml version="1.0" encoding="utf-8"?>
-<p:sld xmlns:a="http://schemas.openxmlformats.org/drawingml/2006/main" xmlns:r="http://schemas.openxmlformats.org/officeDocument/2006/relationships" xmlns:p="http://schemas.openxmlformats.org/presentationml/2006/main">
-  <p:cSld>
-    <p:spTree>
-      <p:nvGrpSpPr>
-        <p:cNvPr id="1" name=""/>
-        <p:cNvGrpSpPr/>
-        <p:nvPr/>
-      </p:nvGrpSpPr>
-      <p:grpSpPr>
-        <a:xfrm>
-          <a:off x="0" y="0"/>
-          <a:ext cx="0" cy="0"/>
-          <a:chOff x="0" y="0"/>
-          <a:chExt cx="0" cy="0"/>
-        </a:xfrm>
-      </p:grpSpPr>
-      <p:sp>
-        <p:nvSpPr>
-          <p:cNvPr id="2" name="Título 1">
-            <a:extLst>
-              <a:ext uri="{FF2B5EF4-FFF2-40B4-BE49-F238E27FC236}">
-                <a16:creationId xmlns:a16="http://schemas.microsoft.com/office/drawing/2014/main" id="{52AAE197-F0F9-9473-1DB5-500BB7130FE8}"/>
-              </a:ext>
-            </a:extLst>
-          </p:cNvPr>
-          <p:cNvSpPr>
-            <a:spLocks noGrp="1"/>
-          </p:cNvSpPr>
-          <p:nvPr>
-            <p:ph type="title"/>
-          </p:nvPr>
-        </p:nvSpPr>
-        <p:spPr/>
-        <p:txBody>
-          <a:bodyPr/>
-          <a:lstStyle/>
-          <a:p>
-            <a:r>
-              <a:rPr lang="pt-PT" dirty="0">
-                <a:latin typeface="Tahoma" panose="020B0604030504040204" pitchFamily="34" charset="0"/>
-                <a:ea typeface="Tahoma" panose="020B0604030504040204" pitchFamily="34" charset="0"/>
-                <a:cs typeface="Tahoma" panose="020B0604030504040204" pitchFamily="34" charset="0"/>
-              </a:rPr>
-              <a:t>UserApp</a:t>
-            </a:r>
-          </a:p>
-        </p:txBody>
-      </p:sp>
-      <p:pic>
-        <p:nvPicPr>
-          <p:cNvPr id="11" name="Marcador de Posição de Conteúdo 10">
-            <a:extLst>
-              <a:ext uri="{FF2B5EF4-FFF2-40B4-BE49-F238E27FC236}">
-                <a16:creationId xmlns:a16="http://schemas.microsoft.com/office/drawing/2014/main" id="{3D642F50-6AD7-FF2C-6C96-BC6FF4B68468}"/>
-              </a:ext>
-            </a:extLst>
-          </p:cNvPr>
-          <p:cNvPicPr>
-            <a:picLocks noGrp="1" noChangeAspect="1"/>
-          </p:cNvPicPr>
-          <p:nvPr>
-            <p:ph idx="1"/>
-          </p:nvPr>
-        </p:nvPicPr>
-        <p:blipFill rotWithShape="1">
-          <a:blip r:embed="rId2"/>
-          <a:srcRect b="1326"/>
-          <a:stretch/>
-        </p:blipFill>
-        <p:spPr>
-          <a:xfrm>
-            <a:off x="4043362" y="2582069"/>
-            <a:ext cx="4105275" cy="2800814"/>
-          </a:xfrm>
-        </p:spPr>
-      </p:pic>
-      <p:sp>
-        <p:nvSpPr>
-          <p:cNvPr id="4" name="Marcador de Posição do Número do Diapositivo 3">
-            <a:extLst>
-              <a:ext uri="{FF2B5EF4-FFF2-40B4-BE49-F238E27FC236}">
-                <a16:creationId xmlns:a16="http://schemas.microsoft.com/office/drawing/2014/main" id="{1D0381FD-7415-60AE-BFEF-BDE9F3D66653}"/>
-              </a:ext>
-            </a:extLst>
-          </p:cNvPr>
-          <p:cNvSpPr>
-            <a:spLocks noGrp="1"/>
-          </p:cNvSpPr>
-          <p:nvPr>
-            <p:ph type="sldNum" sz="quarter" idx="12"/>
-          </p:nvPr>
-        </p:nvSpPr>
-        <p:spPr/>
-        <p:txBody>
-          <a:bodyPr/>
-          <a:lstStyle/>
-          <a:p>
-            <a:fld id="{5E62556B-3FFF-4B1B-8C77-ABD6DF445F62}" type="slidenum">
-              <a:rPr lang="pt-PT" smtClean="0"/>
-              <a:t>8</a:t>
-            </a:fld>
-            <a:endParaRPr lang="pt-PT"/>
-          </a:p>
-        </p:txBody>
-      </p:sp>
-      <p:sp>
-        <p:nvSpPr>
-          <p:cNvPr id="6" name="Marcador de Posição do Rodapé 8">
-            <a:extLst>
-              <a:ext uri="{FF2B5EF4-FFF2-40B4-BE49-F238E27FC236}">
-                <a16:creationId xmlns:a16="http://schemas.microsoft.com/office/drawing/2014/main" id="{24F8F186-5EFD-31FA-92DB-64F8FA2D8EE5}"/>
-              </a:ext>
-            </a:extLst>
-          </p:cNvPr>
-          <p:cNvSpPr>
-            <a:spLocks noGrp="1"/>
-          </p:cNvSpPr>
-          <p:nvPr>
-            <p:ph type="ftr" sz="quarter" idx="11"/>
-          </p:nvPr>
-        </p:nvSpPr>
-        <p:spPr>
-          <a:xfrm>
-            <a:off x="3635578" y="6291131"/>
-            <a:ext cx="4920842" cy="430344"/>
-          </a:xfrm>
-        </p:spPr>
-        <p:txBody>
-          <a:bodyPr/>
-          <a:lstStyle/>
-          <a:p>
-            <a:r>
-              <a:rPr lang="pt-PT" dirty="0">
-                <a:latin typeface="Tahoma" panose="020B0604030504040204" pitchFamily="34" charset="0"/>
-                <a:ea typeface="Tahoma" panose="020B0604030504040204" pitchFamily="34" charset="0"/>
-                <a:cs typeface="Tahoma" panose="020B0604030504040204" pitchFamily="34" charset="0"/>
-              </a:rPr>
-              <a:t> Rafael Carvalho 47663, Ricardo Ramos 46638, Tomás Antunes 45911 Computação Distribuída - SI 23/24 </a:t>
-            </a:r>
-          </a:p>
-        </p:txBody>
-      </p:sp>
-      <p:pic>
-        <p:nvPicPr>
-          <p:cNvPr id="7" name="Picture 2" descr="logo-isel | InOut">
-            <a:extLst>
-              <a:ext uri="{FF2B5EF4-FFF2-40B4-BE49-F238E27FC236}">
-                <a16:creationId xmlns:a16="http://schemas.microsoft.com/office/drawing/2014/main" id="{5710C71F-40BF-29FA-3D3F-820B7C48E081}"/>
-              </a:ext>
-            </a:extLst>
-          </p:cNvPr>
-          <p:cNvPicPr>
-            <a:picLocks noChangeAspect="1" noChangeArrowheads="1"/>
-          </p:cNvPicPr>
-          <p:nvPr/>
-        </p:nvPicPr>
-        <p:blipFill>
-          <a:blip r:embed="rId3">
-            <a:extLst>
-              <a:ext uri="{28A0092B-C50C-407E-A947-70E740481C1C}">
-                <a14:useLocalDpi xmlns:a14="http://schemas.microsoft.com/office/drawing/2010/main" val="0"/>
-              </a:ext>
-            </a:extLst>
-          </a:blip>
-          <a:srcRect/>
-          <a:stretch>
-            <a:fillRect/>
-          </a:stretch>
-        </p:blipFill>
-        <p:spPr bwMode="auto">
-          <a:xfrm>
-            <a:off x="9916886" y="527807"/>
-            <a:ext cx="1661620" cy="1000198"/>
-          </a:xfrm>
-          <a:prstGeom prst="rect">
-            <a:avLst/>
-          </a:prstGeom>
-          <a:noFill/>
-          <a:extLst>
-            <a:ext uri="{909E8E84-426E-40DD-AFC4-6F175D3DCCD1}">
-              <a14:hiddenFill xmlns:a14="http://schemas.microsoft.com/office/drawing/2010/main">
-                <a:solidFill>
-                  <a:srgbClr val="FFFFFF"/>
-                </a:solidFill>
-              </a14:hiddenFill>
-            </a:ext>
-          </a:extLst>
-        </p:spPr>
-      </p:pic>
-      <p:sp>
-        <p:nvSpPr>
-          <p:cNvPr id="12" name="Marcador de Posição de Conteúdo 2">
-            <a:extLst>
-              <a:ext uri="{FF2B5EF4-FFF2-40B4-BE49-F238E27FC236}">
-                <a16:creationId xmlns:a16="http://schemas.microsoft.com/office/drawing/2014/main" id="{657CF41C-6650-EB2B-45EC-67E721D73269}"/>
-              </a:ext>
-            </a:extLst>
-          </p:cNvPr>
-          <p:cNvSpPr txBox="1">
-            <a:spLocks/>
-          </p:cNvSpPr>
-          <p:nvPr/>
-        </p:nvSpPr>
-        <p:spPr>
-          <a:xfrm>
-            <a:off x="838200" y="1825625"/>
-            <a:ext cx="10515600" cy="4351338"/>
-          </a:xfrm>
-          <a:prstGeom prst="rect">
-            <a:avLst/>
-          </a:prstGeom>
-        </p:spPr>
-        <p:txBody>
-          <a:bodyPr vert="horz" lIns="91440" tIns="45720" rIns="91440" bIns="45720" rtlCol="0">
-            <a:normAutofit/>
-          </a:bodyPr>
-          <a:lstStyle>
-            <a:lvl1pPr marL="228600" indent="-228600" algn="l" defTabSz="914400" rtl="0" eaLnBrk="1" latinLnBrk="0" hangingPunct="1">
-              <a:lnSpc>
-                <a:spcPct val="90000"/>
-              </a:lnSpc>
-              <a:spcBef>
-                <a:spcPts val="1000"/>
-              </a:spcBef>
-              <a:buFont typeface="Arial" panose="020B0604020202020204" pitchFamily="34" charset="0"/>
-              <a:buChar char="•"/>
-              <a:defRPr sz="2800" kern="1200">
-                <a:solidFill>
-                  <a:schemeClr val="tx1"/>
-                </a:solidFill>
-                <a:latin typeface="+mn-lt"/>
-                <a:ea typeface="+mn-ea"/>
-                <a:cs typeface="+mn-cs"/>
-              </a:defRPr>
-            </a:lvl1pPr>
-            <a:lvl2pPr marL="685800" indent="-228600" algn="l" defTabSz="914400" rtl="0" eaLnBrk="1" latinLnBrk="0" hangingPunct="1">
-              <a:lnSpc>
-                <a:spcPct val="90000"/>
-              </a:lnSpc>
-              <a:spcBef>
-                <a:spcPts val="500"/>
-              </a:spcBef>
-              <a:buFont typeface="Arial" panose="020B0604020202020204" pitchFamily="34" charset="0"/>
-              <a:buChar char="•"/>
-              <a:defRPr sz="2400" kern="1200">
-                <a:solidFill>
-                  <a:schemeClr val="tx1"/>
-                </a:solidFill>
-                <a:latin typeface="+mn-lt"/>
-                <a:ea typeface="+mn-ea"/>
-                <a:cs typeface="+mn-cs"/>
-              </a:defRPr>
-            </a:lvl2pPr>
-            <a:lvl3pPr marL="1143000" indent="-228600" algn="l" defTabSz="914400" rtl="0" eaLnBrk="1" latinLnBrk="0" hangingPunct="1">
-              <a:lnSpc>
-                <a:spcPct val="90000"/>
-              </a:lnSpc>
-              <a:spcBef>
-                <a:spcPts val="500"/>
-              </a:spcBef>
-              <a:buFont typeface="Arial" panose="020B0604020202020204" pitchFamily="34" charset="0"/>
-              <a:buChar char="•"/>
-              <a:defRPr sz="2000" kern="1200">
-                <a:solidFill>
-                  <a:schemeClr val="tx1"/>
-                </a:solidFill>
-                <a:latin typeface="+mn-lt"/>
-                <a:ea typeface="+mn-ea"/>
-                <a:cs typeface="+mn-cs"/>
-              </a:defRPr>
-            </a:lvl3pPr>
-            <a:lvl4pPr marL="1600200" indent="-228600" algn="l" defTabSz="914400" rtl="0" eaLnBrk="1" latinLnBrk="0" hangingPunct="1">
-              <a:lnSpc>
-                <a:spcPct val="90000"/>
-              </a:lnSpc>
-              <a:spcBef>
-                <a:spcPts val="500"/>
-              </a:spcBef>
-              <a:buFont typeface="Arial" panose="020B0604020202020204" pitchFamily="34" charset="0"/>
-              <a:buChar char="•"/>
-              <a:defRPr sz="1800" kern="1200">
-                <a:solidFill>
-                  <a:schemeClr val="tx1"/>
-                </a:solidFill>
-                <a:latin typeface="+mn-lt"/>
-                <a:ea typeface="+mn-ea"/>
-                <a:cs typeface="+mn-cs"/>
-              </a:defRPr>
-            </a:lvl4pPr>
-            <a:lvl5pPr marL="2057400" indent="-228600" algn="l" defTabSz="914400" rtl="0" eaLnBrk="1" latinLnBrk="0" hangingPunct="1">
-              <a:lnSpc>
-                <a:spcPct val="90000"/>
-              </a:lnSpc>
-              <a:spcBef>
-                <a:spcPts val="500"/>
-              </a:spcBef>
-              <a:buFont typeface="Arial" panose="020B0604020202020204" pitchFamily="34" charset="0"/>
-              <a:buChar char="•"/>
-              <a:defRPr sz="1800" kern="1200">
-                <a:solidFill>
-                  <a:schemeClr val="tx1"/>
-                </a:solidFill>
-                <a:latin typeface="+mn-lt"/>
-                <a:ea typeface="+mn-ea"/>
-                <a:cs typeface="+mn-cs"/>
-              </a:defRPr>
-            </a:lvl5pPr>
-            <a:lvl6pPr marL="2514600" indent="-228600" algn="l" defTabSz="914400" rtl="0" eaLnBrk="1" latinLnBrk="0" hangingPunct="1">
-              <a:lnSpc>
-                <a:spcPct val="90000"/>
-              </a:lnSpc>
-              <a:spcBef>
-                <a:spcPts val="500"/>
-              </a:spcBef>
-              <a:buFont typeface="Arial" panose="020B0604020202020204" pitchFamily="34" charset="0"/>
-              <a:buChar char="•"/>
-              <a:defRPr sz="1800" kern="1200">
-                <a:solidFill>
-                  <a:schemeClr val="tx1"/>
-                </a:solidFill>
-                <a:latin typeface="+mn-lt"/>
-                <a:ea typeface="+mn-ea"/>
-                <a:cs typeface="+mn-cs"/>
-              </a:defRPr>
-            </a:lvl6pPr>
-            <a:lvl7pPr marL="2971800" indent="-228600" algn="l" defTabSz="914400" rtl="0" eaLnBrk="1" latinLnBrk="0" hangingPunct="1">
-              <a:lnSpc>
-                <a:spcPct val="90000"/>
-              </a:lnSpc>
-              <a:spcBef>
-                <a:spcPts val="500"/>
-              </a:spcBef>
-              <a:buFont typeface="Arial" panose="020B0604020202020204" pitchFamily="34" charset="0"/>
-              <a:buChar char="•"/>
-              <a:defRPr sz="1800" kern="1200">
-                <a:solidFill>
-                  <a:schemeClr val="tx1"/>
-                </a:solidFill>
-                <a:latin typeface="+mn-lt"/>
-                <a:ea typeface="+mn-ea"/>
-                <a:cs typeface="+mn-cs"/>
-              </a:defRPr>
-            </a:lvl7pPr>
-            <a:lvl8pPr marL="3429000" indent="-228600" algn="l" defTabSz="914400" rtl="0" eaLnBrk="1" latinLnBrk="0" hangingPunct="1">
-              <a:lnSpc>
-                <a:spcPct val="90000"/>
-              </a:lnSpc>
-              <a:spcBef>
-                <a:spcPts val="500"/>
-              </a:spcBef>
-              <a:buFont typeface="Arial" panose="020B0604020202020204" pitchFamily="34" charset="0"/>
-              <a:buChar char="•"/>
-              <a:defRPr sz="1800" kern="1200">
-                <a:solidFill>
-                  <a:schemeClr val="tx1"/>
-                </a:solidFill>
-                <a:latin typeface="+mn-lt"/>
-                <a:ea typeface="+mn-ea"/>
-                <a:cs typeface="+mn-cs"/>
-              </a:defRPr>
-            </a:lvl8pPr>
-            <a:lvl9pPr marL="3886200" indent="-228600" algn="l" defTabSz="914400" rtl="0" eaLnBrk="1" latinLnBrk="0" hangingPunct="1">
-              <a:lnSpc>
-                <a:spcPct val="90000"/>
-              </a:lnSpc>
-              <a:spcBef>
-                <a:spcPts val="500"/>
-              </a:spcBef>
-              <a:buFont typeface="Arial" panose="020B0604020202020204" pitchFamily="34" charset="0"/>
-              <a:buChar char="•"/>
-              <a:defRPr sz="1800" kern="1200">
-                <a:solidFill>
-                  <a:schemeClr val="tx1"/>
-                </a:solidFill>
-                <a:latin typeface="+mn-lt"/>
-                <a:ea typeface="+mn-ea"/>
-                <a:cs typeface="+mn-cs"/>
-              </a:defRPr>
-            </a:lvl9pPr>
-          </a:lstStyle>
-          <a:p>
-            <a:r>
-              <a:rPr lang="pt-PT" dirty="0">
-                <a:latin typeface="Tahoma" panose="020B0604030504040204" pitchFamily="34" charset="0"/>
-                <a:ea typeface="Tahoma" panose="020B0604030504040204" pitchFamily="34" charset="0"/>
-                <a:cs typeface="Tahoma" panose="020B0604030504040204" pitchFamily="34" charset="0"/>
-              </a:rPr>
-              <a:t>Pede resumos ao </a:t>
-            </a:r>
-            <a:r>
-              <a:rPr lang="pt-PT" i="1" dirty="0">
-                <a:latin typeface="Tahoma" panose="020B0604030504040204" pitchFamily="34" charset="0"/>
-                <a:ea typeface="Tahoma" panose="020B0604030504040204" pitchFamily="34" charset="0"/>
-                <a:cs typeface="Tahoma" panose="020B0604030504040204" pitchFamily="34" charset="0"/>
-              </a:rPr>
-              <a:t>Manager Server</a:t>
-            </a:r>
-            <a:endParaRPr lang="pt-PT" dirty="0">
-              <a:latin typeface="Tahoma" panose="020B0604030504040204" pitchFamily="34" charset="0"/>
-              <a:ea typeface="Tahoma" panose="020B0604030504040204" pitchFamily="34" charset="0"/>
-              <a:cs typeface="Tahoma" panose="020B0604030504040204" pitchFamily="34" charset="0"/>
-            </a:endParaRPr>
-          </a:p>
-        </p:txBody>
-      </p:sp>
-    </p:spTree>
-    <p:extLst>
-      <p:ext uri="{BB962C8B-B14F-4D97-AF65-F5344CB8AC3E}">
-        <p14:creationId xmlns:p14="http://schemas.microsoft.com/office/powerpoint/2010/main" val="3060478155"/>
-      </p:ext>
-    </p:extLst>
-  </p:cSld>
-  <p:clrMapOvr>
-    <a:masterClrMapping/>
-  </p:clrMapOvr>
 </p:sld>
 </file>
 

</xml_diff>